<commit_message>
Ajuste de erro de arquivo
Arquivo subido anteriormente era uma versão desatualizada da apresentação, subindo a versão correta.
</commit_message>
<xml_diff>
--- a/Apresentação/ApresentacaoAPS alternative version.pptx
+++ b/Apresentação/ApresentacaoAPS alternative version.pptx
@@ -201,7 +201,7 @@
           <a:p>
             <a:fld id="{3A073EC4-76E3-45A4-8CE0-06A42BF6381D}" type="datetimeFigureOut">
               <a:rPr lang="pt-BR" smtClean="0"/>
-              <a:t>27/10/2023</a:t>
+              <a:t>16/11/2023</a:t>
             </a:fld>
             <a:endParaRPr lang="pt-BR"/>
           </a:p>
@@ -615,7 +615,7 @@
           <a:p>
             <a:fld id="{5D23714D-8499-4715-9093-21D72E67F4B8}" type="datetimeFigureOut">
               <a:rPr lang="pt-BR" smtClean="0"/>
-              <a:t>27/10/2023</a:t>
+              <a:t>16/11/2023</a:t>
             </a:fld>
             <a:endParaRPr lang="pt-BR"/>
           </a:p>
@@ -813,7 +813,7 @@
           <a:p>
             <a:fld id="{5D23714D-8499-4715-9093-21D72E67F4B8}" type="datetimeFigureOut">
               <a:rPr lang="pt-BR" smtClean="0"/>
-              <a:t>27/10/2023</a:t>
+              <a:t>16/11/2023</a:t>
             </a:fld>
             <a:endParaRPr lang="pt-BR"/>
           </a:p>
@@ -1021,7 +1021,7 @@
           <a:p>
             <a:fld id="{5D23714D-8499-4715-9093-21D72E67F4B8}" type="datetimeFigureOut">
               <a:rPr lang="pt-BR" smtClean="0"/>
-              <a:t>27/10/2023</a:t>
+              <a:t>16/11/2023</a:t>
             </a:fld>
             <a:endParaRPr lang="pt-BR"/>
           </a:p>
@@ -1219,7 +1219,7 @@
           <a:p>
             <a:fld id="{5D23714D-8499-4715-9093-21D72E67F4B8}" type="datetimeFigureOut">
               <a:rPr lang="pt-BR" smtClean="0"/>
-              <a:t>27/10/2023</a:t>
+              <a:t>16/11/2023</a:t>
             </a:fld>
             <a:endParaRPr lang="pt-BR"/>
           </a:p>
@@ -1494,7 +1494,7 @@
           <a:p>
             <a:fld id="{5D23714D-8499-4715-9093-21D72E67F4B8}" type="datetimeFigureOut">
               <a:rPr lang="pt-BR" smtClean="0"/>
-              <a:t>27/10/2023</a:t>
+              <a:t>16/11/2023</a:t>
             </a:fld>
             <a:endParaRPr lang="pt-BR"/>
           </a:p>
@@ -1759,7 +1759,7 @@
           <a:p>
             <a:fld id="{5D23714D-8499-4715-9093-21D72E67F4B8}" type="datetimeFigureOut">
               <a:rPr lang="pt-BR" smtClean="0"/>
-              <a:t>27/10/2023</a:t>
+              <a:t>16/11/2023</a:t>
             </a:fld>
             <a:endParaRPr lang="pt-BR"/>
           </a:p>
@@ -2171,7 +2171,7 @@
           <a:p>
             <a:fld id="{5D23714D-8499-4715-9093-21D72E67F4B8}" type="datetimeFigureOut">
               <a:rPr lang="pt-BR" smtClean="0"/>
-              <a:t>27/10/2023</a:t>
+              <a:t>16/11/2023</a:t>
             </a:fld>
             <a:endParaRPr lang="pt-BR"/>
           </a:p>
@@ -2312,7 +2312,7 @@
           <a:p>
             <a:fld id="{5D23714D-8499-4715-9093-21D72E67F4B8}" type="datetimeFigureOut">
               <a:rPr lang="pt-BR" smtClean="0"/>
-              <a:t>27/10/2023</a:t>
+              <a:t>16/11/2023</a:t>
             </a:fld>
             <a:endParaRPr lang="pt-BR"/>
           </a:p>
@@ -2425,7 +2425,7 @@
           <a:p>
             <a:fld id="{5D23714D-8499-4715-9093-21D72E67F4B8}" type="datetimeFigureOut">
               <a:rPr lang="pt-BR" smtClean="0"/>
-              <a:t>27/10/2023</a:t>
+              <a:t>16/11/2023</a:t>
             </a:fld>
             <a:endParaRPr lang="pt-BR"/>
           </a:p>
@@ -2736,7 +2736,7 @@
           <a:p>
             <a:fld id="{5D23714D-8499-4715-9093-21D72E67F4B8}" type="datetimeFigureOut">
               <a:rPr lang="pt-BR" smtClean="0"/>
-              <a:t>27/10/2023</a:t>
+              <a:t>16/11/2023</a:t>
             </a:fld>
             <a:endParaRPr lang="pt-BR"/>
           </a:p>
@@ -3024,7 +3024,7 @@
           <a:p>
             <a:fld id="{5D23714D-8499-4715-9093-21D72E67F4B8}" type="datetimeFigureOut">
               <a:rPr lang="pt-BR" smtClean="0"/>
-              <a:t>27/10/2023</a:t>
+              <a:t>16/11/2023</a:t>
             </a:fld>
             <a:endParaRPr lang="pt-BR"/>
           </a:p>
@@ -3265,7 +3265,7 @@
           <a:p>
             <a:fld id="{5D23714D-8499-4715-9093-21D72E67F4B8}" type="datetimeFigureOut">
               <a:rPr lang="pt-BR" smtClean="0"/>
-              <a:t>27/10/2023</a:t>
+              <a:t>16/11/2023</a:t>
             </a:fld>
             <a:endParaRPr lang="pt-BR"/>
           </a:p>
@@ -4075,53 +4075,6 @@
       </p:grpSpPr>
       <p:pic>
         <p:nvPicPr>
-          <p:cNvPr id="2050" name="Picture 2">
-            <a:extLst>
-              <a:ext uri="{FF2B5EF4-FFF2-40B4-BE49-F238E27FC236}">
-                <a16:creationId xmlns:a16="http://schemas.microsoft.com/office/drawing/2014/main" id="{9A83BD0A-02ED-1E5F-3DE0-3DCF922B82DF}"/>
-              </a:ext>
-            </a:extLst>
-          </p:cNvPr>
-          <p:cNvPicPr>
-            <a:picLocks noChangeAspect="1" noChangeArrowheads="1"/>
-          </p:cNvPicPr>
-          <p:nvPr/>
-        </p:nvPicPr>
-        <p:blipFill>
-          <a:blip r:embed="rId2">
-            <a:extLst>
-              <a:ext uri="{28A0092B-C50C-407E-A947-70E740481C1C}">
-                <a14:useLocalDpi xmlns:a14="http://schemas.microsoft.com/office/drawing/2010/main" val="0"/>
-              </a:ext>
-            </a:extLst>
-          </a:blip>
-          <a:srcRect/>
-          <a:stretch>
-            <a:fillRect/>
-          </a:stretch>
-        </p:blipFill>
-        <p:spPr bwMode="auto">
-          <a:xfrm>
-            <a:off x="1063004" y="901148"/>
-            <a:ext cx="10065992" cy="5760909"/>
-          </a:xfrm>
-          <a:prstGeom prst="rect">
-            <a:avLst/>
-          </a:prstGeom>
-          <a:noFill/>
-          <a:extLst>
-            <a:ext uri="{909E8E84-426E-40DD-AFC4-6F175D3DCCD1}">
-              <a14:hiddenFill xmlns:a14="http://schemas.microsoft.com/office/drawing/2010/main">
-                <a:solidFill>
-                  <a:srgbClr val="FFFFFF"/>
-                </a:solidFill>
-              </a14:hiddenFill>
-            </a:ext>
-          </a:extLst>
-        </p:spPr>
-      </p:pic>
-      <p:pic>
-        <p:nvPicPr>
           <p:cNvPr id="5" name="Imagem 4" descr="Uma imagem contendo desenho, texto, placa">
             <a:extLst>
               <a:ext uri="{FF2B5EF4-FFF2-40B4-BE49-F238E27FC236}">
@@ -4135,7 +4088,7 @@
           <p:nvPr/>
         </p:nvPicPr>
         <p:blipFill>
-          <a:blip r:embed="rId3">
+          <a:blip r:embed="rId2">
             <a:extLst>
               <a:ext uri="{28A0092B-C50C-407E-A947-70E740481C1C}">
                 <a14:useLocalDpi xmlns:a14="http://schemas.microsoft.com/office/drawing/2010/main" val="0"/>
@@ -4194,6 +4147,36 @@
           </a:p>
         </p:txBody>
       </p:sp>
+      <p:pic>
+        <p:nvPicPr>
+          <p:cNvPr id="6" name="Imagem 5">
+            <a:extLst>
+              <a:ext uri="{FF2B5EF4-FFF2-40B4-BE49-F238E27FC236}">
+                <a16:creationId xmlns:a16="http://schemas.microsoft.com/office/drawing/2014/main" id="{0B951D19-52ED-758D-EAC8-DA86F4D0845C}"/>
+              </a:ext>
+            </a:extLst>
+          </p:cNvPr>
+          <p:cNvPicPr>
+            <a:picLocks noChangeAspect="1"/>
+          </p:cNvPicPr>
+          <p:nvPr/>
+        </p:nvPicPr>
+        <p:blipFill>
+          <a:blip r:embed="rId3"/>
+          <a:stretch>
+            <a:fillRect/>
+          </a:stretch>
+        </p:blipFill>
+        <p:spPr>
+          <a:xfrm>
+            <a:off x="1485900" y="962703"/>
+            <a:ext cx="9220200" cy="5470318"/>
+          </a:xfrm>
+          <a:prstGeom prst="rect">
+            <a:avLst/>
+          </a:prstGeom>
+        </p:spPr>
+      </p:pic>
     </p:spTree>
     <p:extLst>
       <p:ext uri="{BB962C8B-B14F-4D97-AF65-F5344CB8AC3E}">
@@ -4204,89 +4187,6 @@
   <p:clrMapOvr>
     <a:masterClrMapping/>
   </p:clrMapOvr>
-  <p:timing>
-    <p:tnLst>
-      <p:par>
-        <p:cTn id="1" dur="indefinite" restart="never" nodeType="tmRoot">
-          <p:childTnLst>
-            <p:seq concurrent="1" nextAc="seek">
-              <p:cTn id="2" dur="indefinite" nodeType="mainSeq">
-                <p:childTnLst>
-                  <p:par>
-                    <p:cTn id="3" fill="hold">
-                      <p:stCondLst>
-                        <p:cond delay="indefinite"/>
-                      </p:stCondLst>
-                      <p:childTnLst>
-                        <p:par>
-                          <p:cTn id="4" fill="hold">
-                            <p:stCondLst>
-                              <p:cond delay="0"/>
-                            </p:stCondLst>
-                            <p:childTnLst>
-                              <p:par>
-                                <p:cTn id="5" presetID="16" presetClass="entr" presetSubtype="21" fill="hold" nodeType="clickEffect">
-                                  <p:stCondLst>
-                                    <p:cond delay="0"/>
-                                  </p:stCondLst>
-                                  <p:childTnLst>
-                                    <p:set>
-                                      <p:cBhvr>
-                                        <p:cTn id="6" dur="1" fill="hold">
-                                          <p:stCondLst>
-                                            <p:cond delay="0"/>
-                                          </p:stCondLst>
-                                        </p:cTn>
-                                        <p:tgtEl>
-                                          <p:spTgt spid="2050"/>
-                                        </p:tgtEl>
-                                        <p:attrNameLst>
-                                          <p:attrName>style.visibility</p:attrName>
-                                        </p:attrNameLst>
-                                      </p:cBhvr>
-                                      <p:to>
-                                        <p:strVal val="visible"/>
-                                      </p:to>
-                                    </p:set>
-                                    <p:animEffect transition="in" filter="barn(inVertical)">
-                                      <p:cBhvr>
-                                        <p:cTn id="7" dur="500"/>
-                                        <p:tgtEl>
-                                          <p:spTgt spid="2050"/>
-                                        </p:tgtEl>
-                                      </p:cBhvr>
-                                    </p:animEffect>
-                                  </p:childTnLst>
-                                </p:cTn>
-                              </p:par>
-                            </p:childTnLst>
-                          </p:cTn>
-                        </p:par>
-                      </p:childTnLst>
-                    </p:cTn>
-                  </p:par>
-                </p:childTnLst>
-              </p:cTn>
-              <p:prevCondLst>
-                <p:cond evt="onPrev" delay="0">
-                  <p:tgtEl>
-                    <p:sldTgt/>
-                  </p:tgtEl>
-                </p:cond>
-              </p:prevCondLst>
-              <p:nextCondLst>
-                <p:cond evt="onNext" delay="0">
-                  <p:tgtEl>
-                    <p:sldTgt/>
-                  </p:tgtEl>
-                </p:cond>
-              </p:nextCondLst>
-            </p:seq>
-          </p:childTnLst>
-        </p:cTn>
-      </p:par>
-    </p:tnLst>
-  </p:timing>
 </p:sld>
 </file>
 
@@ -4493,7 +4393,7 @@
           <p:spPr>
             <a:xfrm>
               <a:off x="1432560" y="3635023"/>
-              <a:ext cx="3040966" cy="400110"/>
+              <a:ext cx="3306854" cy="400110"/>
             </a:xfrm>
             <a:prstGeom prst="rect">
               <a:avLst/>
@@ -4511,7 +4411,7 @@
                   <a:latin typeface="Arial" panose="020B0604020202020204" pitchFamily="34" charset="0"/>
                   <a:cs typeface="Arial" panose="020B0604020202020204" pitchFamily="34" charset="0"/>
                 </a:rPr>
-                <a:t>API Usada (HG Brasil):</a:t>
+                <a:t>API Usada (HG Weather):</a:t>
               </a:r>
             </a:p>
           </p:txBody>

</xml_diff>